<commit_message>
add more articles and update power-points
</commit_message>
<xml_diff>
--- a/Project Status.pptx
+++ b/Project Status.pptx
@@ -17031,15 +17031,7 @@
             <a:pPr algn="l" rtl="0"/>
             <a:r>
               <a:rPr lang="en-US" sz="2000" dirty="0"/>
-              <a:t>LSTM + </a:t>
-            </a:r>
-            <a:r>
-              <a:rPr lang="en-US" sz="2000" dirty="0" err="1"/>
-              <a:t>Fasttext</a:t>
-            </a:r>
-            <a:r>
-              <a:rPr lang="en-US" sz="2000" dirty="0"/>
-              <a:t> embeddings</a:t>
+              <a:t>LSTM + Glove embeddings</a:t>
             </a:r>
           </a:p>
           <a:p>

</xml_diff>

<commit_message>
update project status and add more links to articles
</commit_message>
<xml_diff>
--- a/Project Status.pptx
+++ b/Project Status.pptx
@@ -5,7 +5,7 @@
     <p:sldMasterId id="2147483672" r:id="rId1"/>
   </p:sldMasterIdLst>
   <p:notesMasterIdLst>
-    <p:notesMasterId r:id="rId16"/>
+    <p:notesMasterId r:id="rId18"/>
   </p:notesMasterIdLst>
   <p:sldIdLst>
     <p:sldId id="256" r:id="rId2"/>
@@ -15,13 +15,15 @@
     <p:sldId id="265" r:id="rId6"/>
     <p:sldId id="266" r:id="rId7"/>
     <p:sldId id="267" r:id="rId8"/>
-    <p:sldId id="268" r:id="rId9"/>
-    <p:sldId id="270" r:id="rId10"/>
-    <p:sldId id="271" r:id="rId11"/>
-    <p:sldId id="269" r:id="rId12"/>
-    <p:sldId id="272" r:id="rId13"/>
-    <p:sldId id="273" r:id="rId14"/>
-    <p:sldId id="262" r:id="rId15"/>
+    <p:sldId id="274" r:id="rId9"/>
+    <p:sldId id="268" r:id="rId10"/>
+    <p:sldId id="270" r:id="rId11"/>
+    <p:sldId id="275" r:id="rId12"/>
+    <p:sldId id="271" r:id="rId13"/>
+    <p:sldId id="269" r:id="rId14"/>
+    <p:sldId id="272" r:id="rId15"/>
+    <p:sldId id="273" r:id="rId16"/>
+    <p:sldId id="262" r:id="rId17"/>
   </p:sldIdLst>
   <p:sldSz cx="12192000" cy="6858000"/>
   <p:notesSz cx="6858000" cy="9144000"/>
@@ -210,7 +212,7 @@
           <a:p>
             <a:fld id="{99B3FE1B-01D1-459D-875F-8154E6AE5851}" type="datetimeFigureOut">
               <a:rPr lang="he-IL" smtClean="0"/>
-              <a:t>כ"ה/כסלו/תשפ"א</a:t>
+              <a:t>כ"ז/כסלו/תשפ"א</a:t>
             </a:fld>
             <a:endParaRPr lang="he-IL"/>
           </a:p>
@@ -712,138 +714,62 @@
           <a:bodyPr/>
           <a:lstStyle/>
           <a:p>
-            <a:pPr lvl="2" algn="l" rtl="0"/>
+            <a:r>
+              <a:rPr lang="he-IL" dirty="0"/>
+              <a:t>מתמקדים ב-</a:t>
+            </a:r>
+            <a:r>
+              <a:rPr lang="en-US" dirty="0"/>
+              <a:t>precision</a:t>
+            </a:r>
+            <a:r>
+              <a:rPr lang="he-IL" dirty="0"/>
+              <a:t> כי מתוך מה שאנחנו אומרים שהוא </a:t>
+            </a:r>
+            <a:r>
+              <a:rPr lang="en-US" dirty="0"/>
+              <a:t>positive</a:t>
+            </a:r>
+            <a:r>
+              <a:rPr lang="he-IL" dirty="0"/>
+              <a:t>, אנו רוצים כמה שיותר לדייק, רוצים "אמון" במסווג ולמזער </a:t>
+            </a:r>
+            <a:r>
+              <a:rPr lang="en-US" dirty="0"/>
+              <a:t>False Positive</a:t>
+            </a:r>
+            <a:r>
+              <a:rPr lang="he-IL" dirty="0"/>
+              <a:t> .</a:t>
+            </a:r>
+          </a:p>
+          <a:p>
+            <a:r>
+              <a:rPr lang="en-US" dirty="0"/>
+              <a:t>SVM</a:t>
+            </a:r>
+            <a:r>
+              <a:rPr lang="he-IL" dirty="0"/>
+              <a:t> : </a:t>
+            </a:r>
+            <a:r>
+              <a:rPr lang="en-US" dirty="0"/>
+              <a:t>precision = 87% with recall ok</a:t>
+            </a:r>
+            <a:endParaRPr lang="he-IL" dirty="0"/>
+          </a:p>
+          <a:p>
             <a:r>
               <a:rPr lang="en-US" dirty="0" err="1"/>
-              <a:t>Fasttext</a:t>
+              <a:t>LogisticRegression</a:t>
             </a:r>
             <a:r>
               <a:rPr lang="en-US" dirty="0"/>
-              <a:t> treats each word as the aggregation of its </a:t>
-            </a:r>
-            <a:r>
-              <a:rPr lang="en-US" dirty="0" err="1"/>
-              <a:t>subwords</a:t>
-            </a:r>
-            <a:r>
-              <a:rPr lang="en-US" dirty="0"/>
-              <a:t> (</a:t>
-            </a:r>
-            <a:r>
-              <a:rPr lang="en-US" dirty="0" err="1"/>
-              <a:t>subwords</a:t>
-            </a:r>
-            <a:r>
-              <a:rPr lang="en-US" dirty="0"/>
-              <a:t> are taken to be the character </a:t>
-            </a:r>
-            <a:r>
-              <a:rPr lang="en-US" dirty="0" err="1"/>
-              <a:t>ngrams</a:t>
-            </a:r>
-            <a:r>
-              <a:rPr lang="en-US" dirty="0"/>
-              <a:t> of the word). The vector for a word is simply taken to be the sum of all vectors of its component char-</a:t>
-            </a:r>
-            <a:r>
-              <a:rPr lang="en-US" dirty="0" err="1"/>
-              <a:t>ngrams</a:t>
-            </a:r>
-            <a:endParaRPr lang="en-US" dirty="0"/>
-          </a:p>
-          <a:p>
-            <a:pPr lvl="2" algn="l" rtl="0"/>
-            <a:r>
-              <a:rPr lang="en-US" dirty="0"/>
-              <a:t>Better for morphologically rich languages (</a:t>
-            </a:r>
-            <a:r>
-              <a:rPr lang="en-US" dirty="0" err="1"/>
-              <a:t>Hebrew,German</a:t>
-            </a:r>
-            <a:r>
-              <a:rPr lang="en-US" dirty="0"/>
-              <a:t>, Turkish </a:t>
-            </a:r>
-            <a:r>
-              <a:rPr lang="en-US" dirty="0" err="1"/>
-              <a:t>etc</a:t>
-            </a:r>
-            <a:r>
-              <a:rPr lang="en-US" dirty="0"/>
-              <a:t>)</a:t>
-            </a:r>
-          </a:p>
-          <a:p>
-            <a:pPr lvl="2" algn="l" rtl="0"/>
-            <a:r>
-              <a:rPr lang="en-US" dirty="0" err="1"/>
-              <a:t>fastText</a:t>
-            </a:r>
-            <a:r>
-              <a:rPr lang="en-US" dirty="0"/>
-              <a:t> can obtain vectors even for out-of-vocabulary (OOV) words, by summing up vectors for its component char-</a:t>
-            </a:r>
-            <a:r>
-              <a:rPr lang="en-US" dirty="0" err="1"/>
-              <a:t>ngrams</a:t>
-            </a:r>
-            <a:r>
-              <a:rPr lang="en-US" dirty="0"/>
-              <a:t>, provided at least one of the char-</a:t>
-            </a:r>
-            <a:r>
-              <a:rPr lang="en-US" dirty="0" err="1"/>
-              <a:t>ngrams</a:t>
-            </a:r>
-            <a:r>
-              <a:rPr lang="en-US" dirty="0"/>
-              <a:t> was present in the training data.</a:t>
-            </a:r>
-          </a:p>
-          <a:p>
-            <a:pPr lvl="2" algn="l" rtl="0"/>
-            <a:r>
-              <a:rPr lang="en-US" dirty="0"/>
-              <a:t>More info in : https://medium.com/swlh/a-quick-overview-of-the-main-difference-between-word2vec-and-fasttext-b9d3f6e274e9</a:t>
-            </a:r>
-          </a:p>
-          <a:p>
-            <a:pPr lvl="2" algn="l" rtl="0"/>
-            <a:endParaRPr lang="en-US" dirty="0"/>
-          </a:p>
-          <a:p>
-            <a:endParaRPr lang="en-US" dirty="0"/>
-          </a:p>
-          <a:p>
-            <a:r>
-              <a:rPr lang="en-US" dirty="0" err="1"/>
-              <a:t>Fasttex</a:t>
-            </a:r>
-            <a:r>
-              <a:rPr lang="he-IL" dirty="0"/>
-              <a:t> הביא לתוצאות זהות , טיפה פחות טובות, מ- </a:t>
-            </a:r>
-            <a:r>
-              <a:rPr lang="en-US" dirty="0"/>
-              <a:t>Doc2Vec</a:t>
-            </a:r>
-            <a:r>
-              <a:rPr lang="he-IL" dirty="0"/>
-              <a:t> , 86% </a:t>
-            </a:r>
-            <a:r>
-              <a:rPr lang="en-US" dirty="0"/>
-              <a:t>precision </a:t>
-            </a:r>
-            <a:r>
-              <a:rPr lang="he-IL" dirty="0"/>
-              <a:t> עם </a:t>
-            </a:r>
-            <a:r>
-              <a:rPr lang="en-US" dirty="0"/>
-              <a:t>88% recall</a:t>
-            </a:r>
+              <a:t> : also precision 87% but a bit less recall</a:t>
+            </a:r>
+          </a:p>
+          <a:p>
+            <a:endParaRPr lang="he-IL" dirty="0"/>
           </a:p>
           <a:p>
             <a:endParaRPr lang="he-IL" dirty="0"/>
@@ -876,7 +802,7 @@
     </p:spTree>
     <p:extLst>
       <p:ext uri="{BB962C8B-B14F-4D97-AF65-F5344CB8AC3E}">
-        <p14:creationId xmlns:p14="http://schemas.microsoft.com/office/powerpoint/2010/main" val="435317737"/>
+        <p14:creationId xmlns:p14="http://schemas.microsoft.com/office/powerpoint/2010/main" val="616588746"/>
       </p:ext>
     </p:extLst>
   </p:cSld>
@@ -930,6 +856,34 @@
           <a:bodyPr/>
           <a:lstStyle/>
           <a:p>
+            <a:r>
+              <a:rPr lang="en-US" dirty="0"/>
+              <a:t>SVM</a:t>
+            </a:r>
+            <a:r>
+              <a:rPr lang="he-IL" dirty="0"/>
+              <a:t> : </a:t>
+            </a:r>
+            <a:r>
+              <a:rPr lang="en-US" dirty="0"/>
+              <a:t>precision = 87% with recall ok</a:t>
+            </a:r>
+            <a:endParaRPr lang="he-IL" dirty="0"/>
+          </a:p>
+          <a:p>
+            <a:r>
+              <a:rPr lang="en-US" dirty="0" err="1"/>
+              <a:t>LogisticRegression</a:t>
+            </a:r>
+            <a:r>
+              <a:rPr lang="en-US" dirty="0"/>
+              <a:t> : also precision 87% but a bit less recall</a:t>
+            </a:r>
+          </a:p>
+          <a:p>
+            <a:endParaRPr lang="he-IL" dirty="0"/>
+          </a:p>
+          <a:p>
             <a:endParaRPr lang="he-IL" dirty="0"/>
           </a:p>
         </p:txBody>
@@ -960,7 +914,7 @@
     </p:spTree>
     <p:extLst>
       <p:ext uri="{BB962C8B-B14F-4D97-AF65-F5344CB8AC3E}">
-        <p14:creationId xmlns:p14="http://schemas.microsoft.com/office/powerpoint/2010/main" val="182595707"/>
+        <p14:creationId xmlns:p14="http://schemas.microsoft.com/office/powerpoint/2010/main" val="3431845864"/>
       </p:ext>
     </p:extLst>
   </p:cSld>
@@ -1014,6 +968,140 @@
           <a:bodyPr/>
           <a:lstStyle/>
           <a:p>
+            <a:pPr lvl="2" algn="l" rtl="0"/>
+            <a:r>
+              <a:rPr lang="en-US" dirty="0" err="1"/>
+              <a:t>Fasttext</a:t>
+            </a:r>
+            <a:r>
+              <a:rPr lang="en-US" dirty="0"/>
+              <a:t> treats each word as the aggregation of its </a:t>
+            </a:r>
+            <a:r>
+              <a:rPr lang="en-US" dirty="0" err="1"/>
+              <a:t>subwords</a:t>
+            </a:r>
+            <a:r>
+              <a:rPr lang="en-US" dirty="0"/>
+              <a:t> (</a:t>
+            </a:r>
+            <a:r>
+              <a:rPr lang="en-US" dirty="0" err="1"/>
+              <a:t>subwords</a:t>
+            </a:r>
+            <a:r>
+              <a:rPr lang="en-US" dirty="0"/>
+              <a:t> are taken to be the character </a:t>
+            </a:r>
+            <a:r>
+              <a:rPr lang="en-US" dirty="0" err="1"/>
+              <a:t>ngrams</a:t>
+            </a:r>
+            <a:r>
+              <a:rPr lang="en-US" dirty="0"/>
+              <a:t> of the word). The vector for a word is simply taken to be the sum of all vectors of its component char-</a:t>
+            </a:r>
+            <a:r>
+              <a:rPr lang="en-US" dirty="0" err="1"/>
+              <a:t>ngrams</a:t>
+            </a:r>
+            <a:endParaRPr lang="en-US" dirty="0"/>
+          </a:p>
+          <a:p>
+            <a:pPr lvl="2" algn="l" rtl="0"/>
+            <a:r>
+              <a:rPr lang="en-US" dirty="0"/>
+              <a:t>Better for morphologically rich languages (</a:t>
+            </a:r>
+            <a:r>
+              <a:rPr lang="en-US" dirty="0" err="1"/>
+              <a:t>Hebrew,German</a:t>
+            </a:r>
+            <a:r>
+              <a:rPr lang="en-US" dirty="0"/>
+              <a:t>, Turkish </a:t>
+            </a:r>
+            <a:r>
+              <a:rPr lang="en-US" dirty="0" err="1"/>
+              <a:t>etc</a:t>
+            </a:r>
+            <a:r>
+              <a:rPr lang="en-US" dirty="0"/>
+              <a:t>)</a:t>
+            </a:r>
+          </a:p>
+          <a:p>
+            <a:pPr lvl="2" algn="l" rtl="0"/>
+            <a:r>
+              <a:rPr lang="en-US" dirty="0" err="1"/>
+              <a:t>fastText</a:t>
+            </a:r>
+            <a:r>
+              <a:rPr lang="en-US" dirty="0"/>
+              <a:t> can obtain vectors even for out-of-vocabulary (OOV) words, by summing up vectors for its component char-</a:t>
+            </a:r>
+            <a:r>
+              <a:rPr lang="en-US" dirty="0" err="1"/>
+              <a:t>ngrams</a:t>
+            </a:r>
+            <a:r>
+              <a:rPr lang="en-US" dirty="0"/>
+              <a:t>, provided at least one of the char-</a:t>
+            </a:r>
+            <a:r>
+              <a:rPr lang="en-US" dirty="0" err="1"/>
+              <a:t>ngrams</a:t>
+            </a:r>
+            <a:r>
+              <a:rPr lang="en-US" dirty="0"/>
+              <a:t> was present in the training data.</a:t>
+            </a:r>
+          </a:p>
+          <a:p>
+            <a:pPr lvl="2" algn="l" rtl="0"/>
+            <a:r>
+              <a:rPr lang="en-US" dirty="0"/>
+              <a:t>More info in : https://medium.com/swlh/a-quick-overview-of-the-main-difference-between-word2vec-and-fasttext-b9d3f6e274e9</a:t>
+            </a:r>
+          </a:p>
+          <a:p>
+            <a:pPr lvl="2" algn="l" rtl="0"/>
+            <a:endParaRPr lang="en-US" dirty="0"/>
+          </a:p>
+          <a:p>
+            <a:endParaRPr lang="en-US" dirty="0"/>
+          </a:p>
+          <a:p>
+            <a:r>
+              <a:rPr lang="en-US" dirty="0" err="1"/>
+              <a:t>Fasttex</a:t>
+            </a:r>
+            <a:r>
+              <a:rPr lang="he-IL" dirty="0"/>
+              <a:t> הביא לתוצאות זהות , טיפה פחות טובות, מ- </a:t>
+            </a:r>
+            <a:r>
+              <a:rPr lang="en-US" dirty="0"/>
+              <a:t>Doc2Vec</a:t>
+            </a:r>
+            <a:r>
+              <a:rPr lang="he-IL" dirty="0"/>
+              <a:t> , 86% </a:t>
+            </a:r>
+            <a:r>
+              <a:rPr lang="en-US" dirty="0"/>
+              <a:t>precision </a:t>
+            </a:r>
+            <a:r>
+              <a:rPr lang="he-IL" dirty="0"/>
+              <a:t> עם </a:t>
+            </a:r>
+            <a:r>
+              <a:rPr lang="en-US" dirty="0"/>
+              <a:t>88% recall</a:t>
+            </a:r>
+          </a:p>
+          <a:p>
             <a:endParaRPr lang="he-IL" dirty="0"/>
           </a:p>
         </p:txBody>
@@ -1044,7 +1132,7 @@
     </p:spTree>
     <p:extLst>
       <p:ext uri="{BB962C8B-B14F-4D97-AF65-F5344CB8AC3E}">
-        <p14:creationId xmlns:p14="http://schemas.microsoft.com/office/powerpoint/2010/main" val="986035441"/>
+        <p14:creationId xmlns:p14="http://schemas.microsoft.com/office/powerpoint/2010/main" val="435317737"/>
       </p:ext>
     </p:extLst>
   </p:cSld>
@@ -1120,6 +1208,174 @@
             <a:fld id="{B6656299-95F5-4672-9317-3DE3BC982A1F}" type="slidenum">
               <a:rPr lang="he-IL" smtClean="0"/>
               <a:t>14</a:t>
+            </a:fld>
+            <a:endParaRPr lang="he-IL"/>
+          </a:p>
+        </p:txBody>
+      </p:sp>
+    </p:spTree>
+    <p:extLst>
+      <p:ext uri="{BB962C8B-B14F-4D97-AF65-F5344CB8AC3E}">
+        <p14:creationId xmlns:p14="http://schemas.microsoft.com/office/powerpoint/2010/main" val="182595707"/>
+      </p:ext>
+    </p:extLst>
+  </p:cSld>
+  <p:clrMapOvr>
+    <a:masterClrMapping/>
+  </p:clrMapOvr>
+</p:notes>
+</file>
+
+<file path=ppt/notesSlides/notesSlide14.xml><?xml version="1.0" encoding="utf-8"?>
+<p:notes xmlns:a="http://schemas.openxmlformats.org/drawingml/2006/main" xmlns:r="http://schemas.openxmlformats.org/officeDocument/2006/relationships" xmlns:p="http://schemas.openxmlformats.org/presentationml/2006/main">
+  <p:cSld>
+    <p:spTree>
+      <p:nvGrpSpPr>
+        <p:cNvPr id="1" name=""/>
+        <p:cNvGrpSpPr/>
+        <p:nvPr/>
+      </p:nvGrpSpPr>
+      <p:grpSpPr>
+        <a:xfrm>
+          <a:off x="0" y="0"/>
+          <a:ext cx="0" cy="0"/>
+          <a:chOff x="0" y="0"/>
+          <a:chExt cx="0" cy="0"/>
+        </a:xfrm>
+      </p:grpSpPr>
+      <p:sp>
+        <p:nvSpPr>
+          <p:cNvPr id="2" name="מציין מיקום של תמונת שקופית 1"/>
+          <p:cNvSpPr>
+            <a:spLocks noGrp="1" noRot="1" noChangeAspect="1"/>
+          </p:cNvSpPr>
+          <p:nvPr>
+            <p:ph type="sldImg"/>
+          </p:nvPr>
+        </p:nvSpPr>
+        <p:spPr/>
+      </p:sp>
+      <p:sp>
+        <p:nvSpPr>
+          <p:cNvPr id="3" name="מציין מיקום של הערות 2"/>
+          <p:cNvSpPr>
+            <a:spLocks noGrp="1"/>
+          </p:cNvSpPr>
+          <p:nvPr>
+            <p:ph type="body" idx="1"/>
+          </p:nvPr>
+        </p:nvSpPr>
+        <p:spPr/>
+        <p:txBody>
+          <a:bodyPr/>
+          <a:lstStyle/>
+          <a:p>
+            <a:endParaRPr lang="he-IL" dirty="0"/>
+          </a:p>
+        </p:txBody>
+      </p:sp>
+      <p:sp>
+        <p:nvSpPr>
+          <p:cNvPr id="4" name="מציין מיקום של מספר שקופית 3"/>
+          <p:cNvSpPr>
+            <a:spLocks noGrp="1"/>
+          </p:cNvSpPr>
+          <p:nvPr>
+            <p:ph type="sldNum" sz="quarter" idx="5"/>
+          </p:nvPr>
+        </p:nvSpPr>
+        <p:spPr/>
+        <p:txBody>
+          <a:bodyPr/>
+          <a:lstStyle/>
+          <a:p>
+            <a:fld id="{B6656299-95F5-4672-9317-3DE3BC982A1F}" type="slidenum">
+              <a:rPr lang="he-IL" smtClean="0"/>
+              <a:t>15</a:t>
+            </a:fld>
+            <a:endParaRPr lang="he-IL"/>
+          </a:p>
+        </p:txBody>
+      </p:sp>
+    </p:spTree>
+    <p:extLst>
+      <p:ext uri="{BB962C8B-B14F-4D97-AF65-F5344CB8AC3E}">
+        <p14:creationId xmlns:p14="http://schemas.microsoft.com/office/powerpoint/2010/main" val="986035441"/>
+      </p:ext>
+    </p:extLst>
+  </p:cSld>
+  <p:clrMapOvr>
+    <a:masterClrMapping/>
+  </p:clrMapOvr>
+</p:notes>
+</file>
+
+<file path=ppt/notesSlides/notesSlide15.xml><?xml version="1.0" encoding="utf-8"?>
+<p:notes xmlns:a="http://schemas.openxmlformats.org/drawingml/2006/main" xmlns:r="http://schemas.openxmlformats.org/officeDocument/2006/relationships" xmlns:p="http://schemas.openxmlformats.org/presentationml/2006/main">
+  <p:cSld>
+    <p:spTree>
+      <p:nvGrpSpPr>
+        <p:cNvPr id="1" name=""/>
+        <p:cNvGrpSpPr/>
+        <p:nvPr/>
+      </p:nvGrpSpPr>
+      <p:grpSpPr>
+        <a:xfrm>
+          <a:off x="0" y="0"/>
+          <a:ext cx="0" cy="0"/>
+          <a:chOff x="0" y="0"/>
+          <a:chExt cx="0" cy="0"/>
+        </a:xfrm>
+      </p:grpSpPr>
+      <p:sp>
+        <p:nvSpPr>
+          <p:cNvPr id="2" name="מציין מיקום של תמונת שקופית 1"/>
+          <p:cNvSpPr>
+            <a:spLocks noGrp="1" noRot="1" noChangeAspect="1"/>
+          </p:cNvSpPr>
+          <p:nvPr>
+            <p:ph type="sldImg"/>
+          </p:nvPr>
+        </p:nvSpPr>
+        <p:spPr/>
+      </p:sp>
+      <p:sp>
+        <p:nvSpPr>
+          <p:cNvPr id="3" name="מציין מיקום של הערות 2"/>
+          <p:cNvSpPr>
+            <a:spLocks noGrp="1"/>
+          </p:cNvSpPr>
+          <p:nvPr>
+            <p:ph type="body" idx="1"/>
+          </p:nvPr>
+        </p:nvSpPr>
+        <p:spPr/>
+        <p:txBody>
+          <a:bodyPr/>
+          <a:lstStyle/>
+          <a:p>
+            <a:endParaRPr lang="he-IL" dirty="0"/>
+          </a:p>
+        </p:txBody>
+      </p:sp>
+      <p:sp>
+        <p:nvSpPr>
+          <p:cNvPr id="4" name="מציין מיקום של מספר שקופית 3"/>
+          <p:cNvSpPr>
+            <a:spLocks noGrp="1"/>
+          </p:cNvSpPr>
+          <p:nvPr>
+            <p:ph type="sldNum" sz="quarter" idx="5"/>
+          </p:nvPr>
+        </p:nvSpPr>
+        <p:spPr/>
+        <p:txBody>
+          <a:bodyPr/>
+          <a:lstStyle/>
+          <a:p>
+            <a:fld id="{B6656299-95F5-4672-9317-3DE3BC982A1F}" type="slidenum">
+              <a:rPr lang="he-IL" smtClean="0"/>
+              <a:t>16</a:t>
             </a:fld>
             <a:endParaRPr lang="he-IL"/>
           </a:p>
@@ -1648,29 +1904,26 @@
           <a:bodyPr/>
           <a:lstStyle/>
           <a:p>
-            <a:pPr marL="0" marR="0" lvl="0" indent="0" algn="r" defTabSz="914400" rtl="1" eaLnBrk="1" fontAlgn="auto" latinLnBrk="0" hangingPunct="1">
-              <a:lnSpc>
-                <a:spcPct val="100000"/>
-              </a:lnSpc>
-              <a:spcBef>
-                <a:spcPts val="0"/>
-              </a:spcBef>
-              <a:spcAft>
-                <a:spcPts val="0"/>
-              </a:spcAft>
-              <a:buClrTx/>
-              <a:buSzTx/>
-              <a:buFontTx/>
-              <a:buNone/>
-              <a:tabLst/>
-              <a:defRPr/>
-            </a:pPr>
             <a:r>
               <a:rPr lang="en-US" dirty="0"/>
-              <a:t>Word2Vec  Trains a unique word embedding for every individual word</a:t>
-            </a:r>
-          </a:p>
-          <a:p>
+              <a:t>Word-cloud</a:t>
+            </a:r>
+            <a:r>
+              <a:rPr lang="he-IL" dirty="0"/>
+              <a:t> בוצע לאחר ניקוי ה-</a:t>
+            </a:r>
+            <a:r>
+              <a:rPr lang="en-US" dirty="0"/>
+              <a:t>data</a:t>
+            </a:r>
+            <a:r>
+              <a:rPr lang="he-IL" dirty="0"/>
+              <a:t> , כאשר הורדנו כאן גם את מילת השלילה </a:t>
+            </a:r>
+            <a:r>
+              <a:rPr lang="en-US" dirty="0"/>
+              <a:t>not</a:t>
+            </a:r>
             <a:endParaRPr lang="he-IL" dirty="0"/>
           </a:p>
         </p:txBody>
@@ -1701,7 +1954,7 @@
     </p:spTree>
     <p:extLst>
       <p:ext uri="{BB962C8B-B14F-4D97-AF65-F5344CB8AC3E}">
-        <p14:creationId xmlns:p14="http://schemas.microsoft.com/office/powerpoint/2010/main" val="992098278"/>
+        <p14:creationId xmlns:p14="http://schemas.microsoft.com/office/powerpoint/2010/main" val="3607146305"/>
       </p:ext>
     </p:extLst>
   </p:cSld>
@@ -1808,7 +2061,7 @@
     </p:spTree>
     <p:extLst>
       <p:ext uri="{BB962C8B-B14F-4D97-AF65-F5344CB8AC3E}">
-        <p14:creationId xmlns:p14="http://schemas.microsoft.com/office/powerpoint/2010/main" val="848175652"/>
+        <p14:creationId xmlns:p14="http://schemas.microsoft.com/office/powerpoint/2010/main" val="992098278"/>
       </p:ext>
     </p:extLst>
   </p:cSld>
@@ -1862,62 +2115,27 @@
           <a:bodyPr/>
           <a:lstStyle/>
           <a:p>
-            <a:r>
-              <a:rPr lang="he-IL" dirty="0"/>
-              <a:t>מתמקדים ב-</a:t>
-            </a:r>
+            <a:pPr marL="0" marR="0" lvl="0" indent="0" algn="r" defTabSz="914400" rtl="1" eaLnBrk="1" fontAlgn="auto" latinLnBrk="0" hangingPunct="1">
+              <a:lnSpc>
+                <a:spcPct val="100000"/>
+              </a:lnSpc>
+              <a:spcBef>
+                <a:spcPts val="0"/>
+              </a:spcBef>
+              <a:spcAft>
+                <a:spcPts val="0"/>
+              </a:spcAft>
+              <a:buClrTx/>
+              <a:buSzTx/>
+              <a:buFontTx/>
+              <a:buNone/>
+              <a:tabLst/>
+              <a:defRPr/>
+            </a:pPr>
             <a:r>
               <a:rPr lang="en-US" dirty="0"/>
-              <a:t>precision</a:t>
-            </a:r>
-            <a:r>
-              <a:rPr lang="he-IL" dirty="0"/>
-              <a:t> כי מתוך מה שאנחנו אומרים שהוא </a:t>
-            </a:r>
-            <a:r>
-              <a:rPr lang="en-US" dirty="0"/>
-              <a:t>positive</a:t>
-            </a:r>
-            <a:r>
-              <a:rPr lang="he-IL" dirty="0"/>
-              <a:t>, אנו רוצים כמה שיותר לדייק, רוצים "אמון" במסווג ולמזער </a:t>
-            </a:r>
-            <a:r>
-              <a:rPr lang="en-US" dirty="0"/>
-              <a:t>False Positive</a:t>
-            </a:r>
-            <a:r>
-              <a:rPr lang="he-IL" dirty="0"/>
-              <a:t> .</a:t>
-            </a:r>
-          </a:p>
-          <a:p>
-            <a:r>
-              <a:rPr lang="en-US" dirty="0"/>
-              <a:t>SVM</a:t>
-            </a:r>
-            <a:r>
-              <a:rPr lang="he-IL" dirty="0"/>
-              <a:t> : </a:t>
-            </a:r>
-            <a:r>
-              <a:rPr lang="en-US" dirty="0"/>
-              <a:t>precision = 87% with recall ok</a:t>
-            </a:r>
-            <a:endParaRPr lang="he-IL" dirty="0"/>
-          </a:p>
-          <a:p>
-            <a:r>
-              <a:rPr lang="en-US" dirty="0" err="1"/>
-              <a:t>LogisticRegression</a:t>
-            </a:r>
-            <a:r>
-              <a:rPr lang="en-US" dirty="0"/>
-              <a:t> : also precision 87% but a bit less recall</a:t>
-            </a:r>
-          </a:p>
-          <a:p>
-            <a:endParaRPr lang="he-IL" dirty="0"/>
+              <a:t>Word2Vec  Trains a unique word embedding for every individual word</a:t>
+            </a:r>
           </a:p>
           <a:p>
             <a:endParaRPr lang="he-IL" dirty="0"/>
@@ -1950,7 +2168,7 @@
     </p:spTree>
     <p:extLst>
       <p:ext uri="{BB962C8B-B14F-4D97-AF65-F5344CB8AC3E}">
-        <p14:creationId xmlns:p14="http://schemas.microsoft.com/office/powerpoint/2010/main" val="3431845864"/>
+        <p14:creationId xmlns:p14="http://schemas.microsoft.com/office/powerpoint/2010/main" val="848175652"/>
       </p:ext>
     </p:extLst>
   </p:cSld>
@@ -2295,7 +2513,7 @@
           <a:p>
             <a:fld id="{8236B938-022E-4225-A7C0-0A189B935F48}" type="datetimeFigureOut">
               <a:rPr lang="he-IL" smtClean="0"/>
-              <a:t>כ"ה/כסלו/תשפ"א</a:t>
+              <a:t>כ"ז/כסלו/תשפ"א</a:t>
             </a:fld>
             <a:endParaRPr lang="he-IL"/>
           </a:p>
@@ -3383,7 +3601,7 @@
           <a:p>
             <a:fld id="{8236B938-022E-4225-A7C0-0A189B935F48}" type="datetimeFigureOut">
               <a:rPr lang="he-IL" smtClean="0"/>
-              <a:t>כ"ה/כסלו/תשפ"א</a:t>
+              <a:t>כ"ז/כסלו/תשפ"א</a:t>
             </a:fld>
             <a:endParaRPr lang="he-IL"/>
           </a:p>
@@ -4363,7 +4581,7 @@
           <a:p>
             <a:fld id="{8236B938-022E-4225-A7C0-0A189B935F48}" type="datetimeFigureOut">
               <a:rPr lang="he-IL" smtClean="0"/>
-              <a:t>כ"ה/כסלו/תשפ"א</a:t>
+              <a:t>כ"ז/כסלו/תשפ"א</a:t>
             </a:fld>
             <a:endParaRPr lang="he-IL"/>
           </a:p>
@@ -5497,7 +5715,7 @@
           <a:p>
             <a:fld id="{8236B938-022E-4225-A7C0-0A189B935F48}" type="datetimeFigureOut">
               <a:rPr lang="he-IL" smtClean="0"/>
-              <a:t>כ"ה/כסלו/תשפ"א</a:t>
+              <a:t>כ"ז/כסלו/תשפ"א</a:t>
             </a:fld>
             <a:endParaRPr lang="he-IL"/>
           </a:p>
@@ -6530,7 +6748,7 @@
           <a:p>
             <a:fld id="{8236B938-022E-4225-A7C0-0A189B935F48}" type="datetimeFigureOut">
               <a:rPr lang="he-IL" smtClean="0"/>
-              <a:t>כ"ה/כסלו/תשפ"א</a:t>
+              <a:t>כ"ז/כסלו/תשפ"א</a:t>
             </a:fld>
             <a:endParaRPr lang="he-IL"/>
           </a:p>
@@ -7190,7 +7408,7 @@
           <a:p>
             <a:fld id="{8236B938-022E-4225-A7C0-0A189B935F48}" type="datetimeFigureOut">
               <a:rPr lang="he-IL" smtClean="0"/>
-              <a:t>כ"ה/כסלו/תשפ"א</a:t>
+              <a:t>כ"ז/כסלו/תשפ"א</a:t>
             </a:fld>
             <a:endParaRPr lang="he-IL"/>
           </a:p>
@@ -8051,7 +8269,7 @@
           <a:p>
             <a:fld id="{8236B938-022E-4225-A7C0-0A189B935F48}" type="datetimeFigureOut">
               <a:rPr lang="he-IL" smtClean="0"/>
-              <a:t>כ"ה/כסלו/תשפ"א</a:t>
+              <a:t>כ"ז/כסלו/תשפ"א</a:t>
             </a:fld>
             <a:endParaRPr lang="he-IL"/>
           </a:p>
@@ -8241,7 +8459,7 @@
           <a:p>
             <a:fld id="{8236B938-022E-4225-A7C0-0A189B935F48}" type="datetimeFigureOut">
               <a:rPr lang="he-IL" smtClean="0"/>
-              <a:t>כ"ה/כסלו/תשפ"א</a:t>
+              <a:t>כ"ז/כסלו/תשפ"א</a:t>
             </a:fld>
             <a:endParaRPr lang="he-IL"/>
           </a:p>
@@ -9213,7 +9431,7 @@
           <a:p>
             <a:fld id="{8236B938-022E-4225-A7C0-0A189B935F48}" type="datetimeFigureOut">
               <a:rPr lang="he-IL" smtClean="0"/>
-              <a:t>כ"ה/כסלו/תשפ"א</a:t>
+              <a:t>כ"ז/כסלו/תשפ"א</a:t>
             </a:fld>
             <a:endParaRPr lang="he-IL"/>
           </a:p>
@@ -9424,7 +9642,7 @@
           <a:p>
             <a:fld id="{8236B938-022E-4225-A7C0-0A189B935F48}" type="datetimeFigureOut">
               <a:rPr lang="he-IL" smtClean="0"/>
-              <a:t>כ"ה/כסלו/תשפ"א</a:t>
+              <a:t>כ"ז/כסלו/תשפ"א</a:t>
             </a:fld>
             <a:endParaRPr lang="he-IL"/>
           </a:p>
@@ -10458,7 +10676,7 @@
           <a:p>
             <a:fld id="{8236B938-022E-4225-A7C0-0A189B935F48}" type="datetimeFigureOut">
               <a:rPr lang="he-IL" smtClean="0"/>
-              <a:t>כ"ה/כסלו/תשפ"א</a:t>
+              <a:t>כ"ז/כסלו/תשפ"א</a:t>
             </a:fld>
             <a:endParaRPr lang="he-IL"/>
           </a:p>
@@ -10730,7 +10948,7 @@
           <a:p>
             <a:fld id="{8236B938-022E-4225-A7C0-0A189B935F48}" type="datetimeFigureOut">
               <a:rPr lang="he-IL" smtClean="0"/>
-              <a:t>כ"ה/כסלו/תשפ"א</a:t>
+              <a:t>כ"ז/כסלו/תשפ"א</a:t>
             </a:fld>
             <a:endParaRPr lang="he-IL"/>
           </a:p>
@@ -11145,7 +11363,7 @@
           <a:p>
             <a:fld id="{8236B938-022E-4225-A7C0-0A189B935F48}" type="datetimeFigureOut">
               <a:rPr lang="he-IL" smtClean="0"/>
-              <a:t>כ"ה/כסלו/תשפ"א</a:t>
+              <a:t>כ"ז/כסלו/תשפ"א</a:t>
             </a:fld>
             <a:endParaRPr lang="he-IL"/>
           </a:p>
@@ -11277,7 +11495,7 @@
           <a:p>
             <a:fld id="{8236B938-022E-4225-A7C0-0A189B935F48}" type="datetimeFigureOut">
               <a:rPr lang="he-IL" smtClean="0"/>
-              <a:t>כ"ה/כסלו/תשפ"א</a:t>
+              <a:t>כ"ז/כסלו/תשפ"א</a:t>
             </a:fld>
             <a:endParaRPr lang="he-IL"/>
           </a:p>
@@ -11372,7 +11590,7 @@
           <a:p>
             <a:fld id="{8236B938-022E-4225-A7C0-0A189B935F48}" type="datetimeFigureOut">
               <a:rPr lang="he-IL" smtClean="0"/>
-              <a:t>כ"ה/כסלו/תשפ"א</a:t>
+              <a:t>כ"ז/כסלו/תשפ"א</a:t>
             </a:fld>
             <a:endParaRPr lang="he-IL"/>
           </a:p>
@@ -12453,7 +12671,7 @@
           <a:p>
             <a:fld id="{8236B938-022E-4225-A7C0-0A189B935F48}" type="datetimeFigureOut">
               <a:rPr lang="he-IL" smtClean="0"/>
-              <a:t>כ"ה/כסלו/תשפ"א</a:t>
+              <a:t>כ"ז/כסלו/תשפ"א</a:t>
             </a:fld>
             <a:endParaRPr lang="he-IL"/>
           </a:p>
@@ -13566,7 +13784,7 @@
           <a:p>
             <a:fld id="{8236B938-022E-4225-A7C0-0A189B935F48}" type="datetimeFigureOut">
               <a:rPr lang="he-IL" smtClean="0"/>
-              <a:t>כ"ה/כסלו/תשפ"א</a:t>
+              <a:t>כ"ז/כסלו/תשפ"א</a:t>
             </a:fld>
             <a:endParaRPr lang="he-IL"/>
           </a:p>
@@ -14563,7 +14781,7 @@
           <a:p>
             <a:fld id="{8236B938-022E-4225-A7C0-0A189B935F48}" type="datetimeFigureOut">
               <a:rPr lang="he-IL" smtClean="0"/>
-              <a:t>כ"ה/כסלו/תשפ"א</a:t>
+              <a:t>כ"ז/כסלו/תשפ"א</a:t>
             </a:fld>
             <a:endParaRPr lang="he-IL"/>
           </a:p>
@@ -15942,12 +16160,51 @@
             <a:pPr rtl="0"/>
             <a:r>
               <a:rPr lang="en-US" dirty="0"/>
-              <a:t>Part 4- ML</a:t>
+              <a:t>Part 3- Embeddings</a:t>
             </a:r>
             <a:endParaRPr lang="he-IL" dirty="0"/>
           </a:p>
         </p:txBody>
       </p:sp>
+      <p:pic>
+        <p:nvPicPr>
+          <p:cNvPr id="14" name="תמונה 13" descr="תמונה שמכילה טקסט, לוח ציור&#10;&#10;התיאור נוצר באופן אוטומטי">
+            <a:extLst>
+              <a:ext uri="{FF2B5EF4-FFF2-40B4-BE49-F238E27FC236}">
+                <a16:creationId xmlns:a16="http://schemas.microsoft.com/office/drawing/2014/main" id="{53CBA9EF-D9F9-4C13-B3C2-8C34DE510BAD}"/>
+              </a:ext>
+            </a:extLst>
+          </p:cNvPr>
+          <p:cNvPicPr>
+            <a:picLocks noChangeAspect="1"/>
+          </p:cNvPicPr>
+          <p:nvPr/>
+        </p:nvPicPr>
+        <p:blipFill>
+          <a:blip r:embed="rId3">
+            <a:extLst>
+              <a:ext uri="{28A0092B-C50C-407E-A947-70E740481C1C}">
+                <a14:useLocalDpi xmlns:a14="http://schemas.microsoft.com/office/drawing/2010/main" val="0"/>
+              </a:ext>
+              <a:ext uri="{837473B0-CC2E-450A-ABE3-18F120FF3D39}">
+                <a1611:picAttrSrcUrl xmlns:a1611="http://schemas.microsoft.com/office/drawing/2016/11/main" r:id="rId4"/>
+              </a:ext>
+            </a:extLst>
+          </a:blip>
+          <a:stretch>
+            <a:fillRect/>
+          </a:stretch>
+        </p:blipFill>
+        <p:spPr>
+          <a:xfrm>
+            <a:off x="9916367" y="1489243"/>
+            <a:ext cx="1862889" cy="1241925"/>
+          </a:xfrm>
+          <a:prstGeom prst="rect">
+            <a:avLst/>
+          </a:prstGeom>
+        </p:spPr>
+      </p:pic>
       <p:sp>
         <p:nvSpPr>
           <p:cNvPr id="17" name="מציין מיקום תוכן 2">
@@ -16204,13 +16461,747 @@
             <a:pPr algn="l" rtl="0"/>
             <a:r>
               <a:rPr lang="en-US" sz="2000" dirty="0"/>
+              <a:t>Word2Vec  (Doc2Vec)</a:t>
+            </a:r>
+            <a:endParaRPr lang="en-US" sz="1800" dirty="0"/>
+          </a:p>
+          <a:p>
+            <a:pPr marL="0" indent="0" algn="l" rtl="0">
+              <a:buNone/>
+            </a:pPr>
+            <a:endParaRPr lang="he-IL" dirty="0"/>
+          </a:p>
+        </p:txBody>
+      </p:sp>
+      <p:pic>
+        <p:nvPicPr>
+          <p:cNvPr id="1026" name="Picture 2" descr="Creating Word Embeddings: Coding the Word2Vec Algorithm in Python using  Deep Learning | by Eligijus Bujokas | Towards Data Science">
+            <a:extLst>
+              <a:ext uri="{FF2B5EF4-FFF2-40B4-BE49-F238E27FC236}">
+                <a16:creationId xmlns:a16="http://schemas.microsoft.com/office/drawing/2014/main" id="{5AC04679-B2E9-4772-B6F3-42D9BF03ECD1}"/>
+              </a:ext>
+            </a:extLst>
+          </p:cNvPr>
+          <p:cNvPicPr>
+            <a:picLocks noChangeAspect="1" noChangeArrowheads="1"/>
+          </p:cNvPicPr>
+          <p:nvPr/>
+        </p:nvPicPr>
+        <p:blipFill>
+          <a:blip r:embed="rId5">
+            <a:extLst>
+              <a:ext uri="{28A0092B-C50C-407E-A947-70E740481C1C}">
+                <a14:useLocalDpi xmlns:a14="http://schemas.microsoft.com/office/drawing/2010/main" val="0"/>
+              </a:ext>
+            </a:extLst>
+          </a:blip>
+          <a:srcRect/>
+          <a:stretch>
+            <a:fillRect/>
+          </a:stretch>
+        </p:blipFill>
+        <p:spPr bwMode="auto">
+          <a:xfrm>
+            <a:off x="1911696" y="3429000"/>
+            <a:ext cx="7928811" cy="2776116"/>
+          </a:xfrm>
+          <a:prstGeom prst="rect">
+            <a:avLst/>
+          </a:prstGeom>
+          <a:noFill/>
+          <a:extLst>
+            <a:ext uri="{909E8E84-426E-40DD-AFC4-6F175D3DCCD1}">
+              <a14:hiddenFill xmlns:a14="http://schemas.microsoft.com/office/drawing/2010/main">
+                <a:solidFill>
+                  <a:srgbClr val="FFFFFF"/>
+                </a:solidFill>
+              </a14:hiddenFill>
+            </a:ext>
+          </a:extLst>
+        </p:spPr>
+      </p:pic>
+    </p:spTree>
+    <p:extLst>
+      <p:ext uri="{BB962C8B-B14F-4D97-AF65-F5344CB8AC3E}">
+        <p14:creationId xmlns:p14="http://schemas.microsoft.com/office/powerpoint/2010/main" val="3206100885"/>
+      </p:ext>
+    </p:extLst>
+  </p:cSld>
+  <p:clrMapOvr>
+    <a:masterClrMapping/>
+  </p:clrMapOvr>
+</p:sld>
+</file>
+
+<file path=ppt/slides/slide11.xml><?xml version="1.0" encoding="utf-8"?>
+<p:sld xmlns:a="http://schemas.openxmlformats.org/drawingml/2006/main" xmlns:r="http://schemas.openxmlformats.org/officeDocument/2006/relationships" xmlns:p="http://schemas.openxmlformats.org/presentationml/2006/main">
+  <p:cSld>
+    <p:spTree>
+      <p:nvGrpSpPr>
+        <p:cNvPr id="1" name=""/>
+        <p:cNvGrpSpPr/>
+        <p:nvPr/>
+      </p:nvGrpSpPr>
+      <p:grpSpPr>
+        <a:xfrm>
+          <a:off x="0" y="0"/>
+          <a:ext cx="0" cy="0"/>
+          <a:chOff x="0" y="0"/>
+          <a:chExt cx="0" cy="0"/>
+        </a:xfrm>
+      </p:grpSpPr>
+      <p:sp>
+        <p:nvSpPr>
+          <p:cNvPr id="2" name="כותרת 1">
+            <a:extLst>
+              <a:ext uri="{FF2B5EF4-FFF2-40B4-BE49-F238E27FC236}">
+                <a16:creationId xmlns:a16="http://schemas.microsoft.com/office/drawing/2014/main" id="{CEA14CE6-73BD-4E74-9E3A-67568D099D44}"/>
+              </a:ext>
+            </a:extLst>
+          </p:cNvPr>
+          <p:cNvSpPr>
+            <a:spLocks noGrp="1"/>
+          </p:cNvSpPr>
+          <p:nvPr>
+            <p:ph type="title"/>
+          </p:nvPr>
+        </p:nvSpPr>
+        <p:spPr/>
+        <p:txBody>
+          <a:bodyPr/>
+          <a:lstStyle/>
+          <a:p>
+            <a:pPr rtl="0"/>
+            <a:r>
+              <a:rPr lang="en-US" dirty="0"/>
+              <a:t>Part 4- ML</a:t>
+            </a:r>
+            <a:endParaRPr lang="he-IL" dirty="0"/>
+          </a:p>
+        </p:txBody>
+      </p:sp>
+      <p:sp>
+        <p:nvSpPr>
+          <p:cNvPr id="17" name="מציין מיקום תוכן 2">
+            <a:extLst>
+              <a:ext uri="{FF2B5EF4-FFF2-40B4-BE49-F238E27FC236}">
+                <a16:creationId xmlns:a16="http://schemas.microsoft.com/office/drawing/2014/main" id="{D13B85E5-5B8D-45D5-8849-846A485091BF}"/>
+              </a:ext>
+            </a:extLst>
+          </p:cNvPr>
+          <p:cNvSpPr txBox="1">
+            <a:spLocks/>
+          </p:cNvSpPr>
+          <p:nvPr/>
+        </p:nvSpPr>
+        <p:spPr>
+          <a:xfrm>
+            <a:off x="1154954" y="2468031"/>
+            <a:ext cx="10202858" cy="3884643"/>
+          </a:xfrm>
+          <a:prstGeom prst="rect">
+            <a:avLst/>
+          </a:prstGeom>
+        </p:spPr>
+        <p:txBody>
+          <a:bodyPr/>
+          <a:lstStyle>
+            <a:lvl1pPr marL="342900" indent="-342900" algn="r" defTabSz="457200" rtl="1" eaLnBrk="1" latinLnBrk="0" hangingPunct="1">
+              <a:spcBef>
+                <a:spcPts val="1000"/>
+              </a:spcBef>
+              <a:spcAft>
+                <a:spcPts val="0"/>
+              </a:spcAft>
+              <a:buClr>
+                <a:schemeClr val="accent1"/>
+              </a:buClr>
+              <a:buSzPct val="80000"/>
+              <a:buFont typeface="Wingdings 3" charset="2"/>
+              <a:buChar char=""/>
+              <a:defRPr sz="1800" b="0" i="0" kern="1200">
+                <a:solidFill>
+                  <a:schemeClr val="tx1">
+                    <a:lumMod val="75000"/>
+                    <a:lumOff val="25000"/>
+                  </a:schemeClr>
+                </a:solidFill>
+                <a:latin typeface="+mn-lt"/>
+                <a:ea typeface="+mn-ea"/>
+                <a:cs typeface="+mn-cs"/>
+              </a:defRPr>
+            </a:lvl1pPr>
+            <a:lvl2pPr marL="742950" indent="-285750" algn="r" defTabSz="457200" rtl="1" eaLnBrk="1" latinLnBrk="0" hangingPunct="1">
+              <a:spcBef>
+                <a:spcPts val="1000"/>
+              </a:spcBef>
+              <a:spcAft>
+                <a:spcPts val="0"/>
+              </a:spcAft>
+              <a:buClr>
+                <a:schemeClr val="accent1"/>
+              </a:buClr>
+              <a:buSzPct val="80000"/>
+              <a:buFont typeface="Wingdings 3" charset="2"/>
+              <a:buChar char=""/>
+              <a:defRPr sz="1600" b="0" i="0" kern="1200">
+                <a:solidFill>
+                  <a:schemeClr val="tx1">
+                    <a:lumMod val="75000"/>
+                    <a:lumOff val="25000"/>
+                  </a:schemeClr>
+                </a:solidFill>
+                <a:latin typeface="+mn-lt"/>
+                <a:ea typeface="+mn-ea"/>
+                <a:cs typeface="+mn-cs"/>
+              </a:defRPr>
+            </a:lvl2pPr>
+            <a:lvl3pPr marL="1143000" indent="-228600" algn="r" defTabSz="457200" rtl="1" eaLnBrk="1" latinLnBrk="0" hangingPunct="1">
+              <a:spcBef>
+                <a:spcPts val="1000"/>
+              </a:spcBef>
+              <a:spcAft>
+                <a:spcPts val="0"/>
+              </a:spcAft>
+              <a:buClr>
+                <a:schemeClr val="accent1"/>
+              </a:buClr>
+              <a:buSzPct val="80000"/>
+              <a:buFont typeface="Wingdings 3" charset="2"/>
+              <a:buChar char=""/>
+              <a:defRPr sz="1400" b="0" i="0" kern="1200">
+                <a:solidFill>
+                  <a:schemeClr val="tx1">
+                    <a:lumMod val="75000"/>
+                    <a:lumOff val="25000"/>
+                  </a:schemeClr>
+                </a:solidFill>
+                <a:latin typeface="+mn-lt"/>
+                <a:ea typeface="+mn-ea"/>
+                <a:cs typeface="+mn-cs"/>
+              </a:defRPr>
+            </a:lvl3pPr>
+            <a:lvl4pPr marL="1600200" indent="-228600" algn="r" defTabSz="457200" rtl="1" eaLnBrk="1" latinLnBrk="0" hangingPunct="1">
+              <a:spcBef>
+                <a:spcPts val="1000"/>
+              </a:spcBef>
+              <a:spcAft>
+                <a:spcPts val="0"/>
+              </a:spcAft>
+              <a:buClr>
+                <a:schemeClr val="accent1"/>
+              </a:buClr>
+              <a:buSzPct val="80000"/>
+              <a:buFont typeface="Wingdings 3" charset="2"/>
+              <a:buChar char=""/>
+              <a:defRPr sz="1200" b="0" i="0" kern="1200">
+                <a:solidFill>
+                  <a:schemeClr val="tx1">
+                    <a:lumMod val="75000"/>
+                    <a:lumOff val="25000"/>
+                  </a:schemeClr>
+                </a:solidFill>
+                <a:latin typeface="+mn-lt"/>
+                <a:ea typeface="+mn-ea"/>
+                <a:cs typeface="+mn-cs"/>
+              </a:defRPr>
+            </a:lvl4pPr>
+            <a:lvl5pPr marL="2057400" indent="-228600" algn="r" defTabSz="457200" rtl="1" eaLnBrk="1" latinLnBrk="0" hangingPunct="1">
+              <a:spcBef>
+                <a:spcPts val="1000"/>
+              </a:spcBef>
+              <a:spcAft>
+                <a:spcPts val="0"/>
+              </a:spcAft>
+              <a:buClr>
+                <a:schemeClr val="accent1"/>
+              </a:buClr>
+              <a:buSzPct val="80000"/>
+              <a:buFont typeface="Wingdings 3" charset="2"/>
+              <a:buChar char=""/>
+              <a:defRPr sz="1200" b="0" i="0" kern="1200">
+                <a:solidFill>
+                  <a:schemeClr val="tx1">
+                    <a:lumMod val="75000"/>
+                    <a:lumOff val="25000"/>
+                  </a:schemeClr>
+                </a:solidFill>
+                <a:latin typeface="+mn-lt"/>
+                <a:ea typeface="+mn-ea"/>
+                <a:cs typeface="+mn-cs"/>
+              </a:defRPr>
+            </a:lvl5pPr>
+            <a:lvl6pPr marL="2514600" indent="-228600" algn="r" defTabSz="457200" rtl="1" eaLnBrk="1" latinLnBrk="0" hangingPunct="1">
+              <a:spcBef>
+                <a:spcPts val="1000"/>
+              </a:spcBef>
+              <a:spcAft>
+                <a:spcPts val="0"/>
+              </a:spcAft>
+              <a:buClr>
+                <a:schemeClr val="accent1"/>
+              </a:buClr>
+              <a:buSzPct val="80000"/>
+              <a:buFont typeface="Wingdings 3" charset="2"/>
+              <a:buChar char=""/>
+              <a:defRPr sz="1200" b="0" i="0" kern="1200">
+                <a:solidFill>
+                  <a:schemeClr val="tx1">
+                    <a:lumMod val="75000"/>
+                    <a:lumOff val="25000"/>
+                  </a:schemeClr>
+                </a:solidFill>
+                <a:latin typeface="+mn-lt"/>
+                <a:ea typeface="+mn-ea"/>
+                <a:cs typeface="+mn-cs"/>
+              </a:defRPr>
+            </a:lvl6pPr>
+            <a:lvl7pPr marL="2971800" indent="-228600" algn="r" defTabSz="457200" rtl="1" eaLnBrk="1" latinLnBrk="0" hangingPunct="1">
+              <a:spcBef>
+                <a:spcPts val="1000"/>
+              </a:spcBef>
+              <a:spcAft>
+                <a:spcPts val="0"/>
+              </a:spcAft>
+              <a:buClr>
+                <a:schemeClr val="accent1"/>
+              </a:buClr>
+              <a:buSzPct val="80000"/>
+              <a:buFont typeface="Wingdings 3" charset="2"/>
+              <a:buChar char=""/>
+              <a:defRPr sz="1200" b="0" i="0" kern="1200">
+                <a:solidFill>
+                  <a:schemeClr val="tx1">
+                    <a:lumMod val="75000"/>
+                    <a:lumOff val="25000"/>
+                  </a:schemeClr>
+                </a:solidFill>
+                <a:latin typeface="+mn-lt"/>
+                <a:ea typeface="+mn-ea"/>
+                <a:cs typeface="+mn-cs"/>
+              </a:defRPr>
+            </a:lvl7pPr>
+            <a:lvl8pPr marL="3429000" indent="-228600" algn="r" defTabSz="457200" rtl="1" eaLnBrk="1" latinLnBrk="0" hangingPunct="1">
+              <a:spcBef>
+                <a:spcPts val="1000"/>
+              </a:spcBef>
+              <a:spcAft>
+                <a:spcPts val="0"/>
+              </a:spcAft>
+              <a:buClr>
+                <a:schemeClr val="accent1"/>
+              </a:buClr>
+              <a:buSzPct val="80000"/>
+              <a:buFont typeface="Wingdings 3" charset="2"/>
+              <a:buChar char=""/>
+              <a:defRPr sz="1200" b="0" i="0" kern="1200">
+                <a:solidFill>
+                  <a:schemeClr val="tx1">
+                    <a:lumMod val="75000"/>
+                    <a:lumOff val="25000"/>
+                  </a:schemeClr>
+                </a:solidFill>
+                <a:latin typeface="+mn-lt"/>
+                <a:ea typeface="+mn-ea"/>
+                <a:cs typeface="+mn-cs"/>
+              </a:defRPr>
+            </a:lvl8pPr>
+            <a:lvl9pPr marL="3886200" indent="-228600" algn="r" defTabSz="457200" rtl="1" eaLnBrk="1" latinLnBrk="0" hangingPunct="1">
+              <a:spcBef>
+                <a:spcPts val="1000"/>
+              </a:spcBef>
+              <a:spcAft>
+                <a:spcPts val="0"/>
+              </a:spcAft>
+              <a:buClr>
+                <a:schemeClr val="accent1"/>
+              </a:buClr>
+              <a:buSzPct val="80000"/>
+              <a:buFont typeface="Wingdings 3" charset="2"/>
+              <a:buChar char=""/>
+              <a:defRPr sz="1200" b="0" i="0" kern="1200">
+                <a:solidFill>
+                  <a:schemeClr val="tx1">
+                    <a:lumMod val="75000"/>
+                    <a:lumOff val="25000"/>
+                  </a:schemeClr>
+                </a:solidFill>
+                <a:latin typeface="+mn-lt"/>
+                <a:ea typeface="+mn-ea"/>
+                <a:cs typeface="+mn-cs"/>
+              </a:defRPr>
+            </a:lvl9pPr>
+          </a:lstStyle>
+          <a:p>
+            <a:pPr algn="l" rtl="0"/>
+            <a:r>
+              <a:rPr lang="en-US" sz="2000" dirty="0"/>
               <a:t>Score we focus on : Precision</a:t>
             </a:r>
+            <a:br>
+              <a:rPr lang="en-US" sz="2000" dirty="0"/>
+            </a:br>
             <a:br>
               <a:rPr lang="en-US" sz="2000" dirty="0"/>
             </a:br>
             <a:endParaRPr lang="en-US" sz="2000" dirty="0"/>
           </a:p>
+          <a:p>
+            <a:pPr algn="l" rtl="0"/>
+            <a:r>
+              <a:rPr lang="en-US" sz="2000" dirty="0"/>
+              <a:t>VADER vectorization has the worse results (why?)</a:t>
+            </a:r>
+          </a:p>
+          <a:p>
+            <a:pPr algn="l" rtl="0"/>
+            <a:r>
+              <a:rPr lang="en-US" sz="2000" dirty="0"/>
+              <a:t>TF-IDF – Best Result</a:t>
+            </a:r>
+          </a:p>
+          <a:p>
+            <a:pPr algn="l" rtl="0"/>
+            <a:endParaRPr lang="en-US" sz="2000" dirty="0"/>
+          </a:p>
+          <a:p>
+            <a:pPr algn="l" rtl="0"/>
+            <a:r>
+              <a:rPr lang="en-US" sz="2000" dirty="0"/>
+              <a:t>In the first phase we used relatively small amount of the most 500 common tokens, to get the idea for the best directions</a:t>
+            </a:r>
+            <a:endParaRPr lang="he-IL" sz="2000" dirty="0"/>
+          </a:p>
+          <a:p>
+            <a:pPr marL="0" indent="0" algn="l" rtl="0">
+              <a:buNone/>
+            </a:pPr>
+            <a:endParaRPr lang="en-US" sz="2000" dirty="0"/>
+          </a:p>
+          <a:p>
+            <a:pPr lvl="1" algn="l" rtl="0"/>
+            <a:endParaRPr lang="en-US" dirty="0"/>
+          </a:p>
+          <a:p>
+            <a:pPr marL="0" indent="0" algn="l" rtl="0">
+              <a:buNone/>
+            </a:pPr>
+            <a:endParaRPr lang="he-IL" dirty="0"/>
+          </a:p>
+        </p:txBody>
+      </p:sp>
+    </p:spTree>
+    <p:extLst>
+      <p:ext uri="{BB962C8B-B14F-4D97-AF65-F5344CB8AC3E}">
+        <p14:creationId xmlns:p14="http://schemas.microsoft.com/office/powerpoint/2010/main" val="4018040784"/>
+      </p:ext>
+    </p:extLst>
+  </p:cSld>
+  <p:clrMapOvr>
+    <a:masterClrMapping/>
+  </p:clrMapOvr>
+</p:sld>
+</file>
+
+<file path=ppt/slides/slide12.xml><?xml version="1.0" encoding="utf-8"?>
+<p:sld xmlns:a="http://schemas.openxmlformats.org/drawingml/2006/main" xmlns:r="http://schemas.openxmlformats.org/officeDocument/2006/relationships" xmlns:p="http://schemas.openxmlformats.org/presentationml/2006/main">
+  <p:cSld>
+    <p:spTree>
+      <p:nvGrpSpPr>
+        <p:cNvPr id="1" name=""/>
+        <p:cNvGrpSpPr/>
+        <p:nvPr/>
+      </p:nvGrpSpPr>
+      <p:grpSpPr>
+        <a:xfrm>
+          <a:off x="0" y="0"/>
+          <a:ext cx="0" cy="0"/>
+          <a:chOff x="0" y="0"/>
+          <a:chExt cx="0" cy="0"/>
+        </a:xfrm>
+      </p:grpSpPr>
+      <p:sp>
+        <p:nvSpPr>
+          <p:cNvPr id="2" name="כותרת 1">
+            <a:extLst>
+              <a:ext uri="{FF2B5EF4-FFF2-40B4-BE49-F238E27FC236}">
+                <a16:creationId xmlns:a16="http://schemas.microsoft.com/office/drawing/2014/main" id="{CEA14CE6-73BD-4E74-9E3A-67568D099D44}"/>
+              </a:ext>
+            </a:extLst>
+          </p:cNvPr>
+          <p:cNvSpPr>
+            <a:spLocks noGrp="1"/>
+          </p:cNvSpPr>
+          <p:nvPr>
+            <p:ph type="title"/>
+          </p:nvPr>
+        </p:nvSpPr>
+        <p:spPr/>
+        <p:txBody>
+          <a:bodyPr/>
+          <a:lstStyle/>
+          <a:p>
+            <a:pPr rtl="0"/>
+            <a:r>
+              <a:rPr lang="en-US" dirty="0"/>
+              <a:t>Part 4- ML</a:t>
+            </a:r>
+            <a:endParaRPr lang="he-IL" dirty="0"/>
+          </a:p>
+        </p:txBody>
+      </p:sp>
+      <p:sp>
+        <p:nvSpPr>
+          <p:cNvPr id="17" name="מציין מיקום תוכן 2">
+            <a:extLst>
+              <a:ext uri="{FF2B5EF4-FFF2-40B4-BE49-F238E27FC236}">
+                <a16:creationId xmlns:a16="http://schemas.microsoft.com/office/drawing/2014/main" id="{D13B85E5-5B8D-45D5-8849-846A485091BF}"/>
+              </a:ext>
+            </a:extLst>
+          </p:cNvPr>
+          <p:cNvSpPr txBox="1">
+            <a:spLocks/>
+          </p:cNvSpPr>
+          <p:nvPr/>
+        </p:nvSpPr>
+        <p:spPr>
+          <a:xfrm>
+            <a:off x="1154954" y="2468032"/>
+            <a:ext cx="10202858" cy="3860580"/>
+          </a:xfrm>
+          <a:prstGeom prst="rect">
+            <a:avLst/>
+          </a:prstGeom>
+        </p:spPr>
+        <p:txBody>
+          <a:bodyPr/>
+          <a:lstStyle>
+            <a:lvl1pPr marL="342900" indent="-342900" algn="r" defTabSz="457200" rtl="1" eaLnBrk="1" latinLnBrk="0" hangingPunct="1">
+              <a:spcBef>
+                <a:spcPts val="1000"/>
+              </a:spcBef>
+              <a:spcAft>
+                <a:spcPts val="0"/>
+              </a:spcAft>
+              <a:buClr>
+                <a:schemeClr val="accent1"/>
+              </a:buClr>
+              <a:buSzPct val="80000"/>
+              <a:buFont typeface="Wingdings 3" charset="2"/>
+              <a:buChar char=""/>
+              <a:defRPr sz="1800" b="0" i="0" kern="1200">
+                <a:solidFill>
+                  <a:schemeClr val="tx1">
+                    <a:lumMod val="75000"/>
+                    <a:lumOff val="25000"/>
+                  </a:schemeClr>
+                </a:solidFill>
+                <a:latin typeface="+mn-lt"/>
+                <a:ea typeface="+mn-ea"/>
+                <a:cs typeface="+mn-cs"/>
+              </a:defRPr>
+            </a:lvl1pPr>
+            <a:lvl2pPr marL="742950" indent="-285750" algn="r" defTabSz="457200" rtl="1" eaLnBrk="1" latinLnBrk="0" hangingPunct="1">
+              <a:spcBef>
+                <a:spcPts val="1000"/>
+              </a:spcBef>
+              <a:spcAft>
+                <a:spcPts val="0"/>
+              </a:spcAft>
+              <a:buClr>
+                <a:schemeClr val="accent1"/>
+              </a:buClr>
+              <a:buSzPct val="80000"/>
+              <a:buFont typeface="Wingdings 3" charset="2"/>
+              <a:buChar char=""/>
+              <a:defRPr sz="1600" b="0" i="0" kern="1200">
+                <a:solidFill>
+                  <a:schemeClr val="tx1">
+                    <a:lumMod val="75000"/>
+                    <a:lumOff val="25000"/>
+                  </a:schemeClr>
+                </a:solidFill>
+                <a:latin typeface="+mn-lt"/>
+                <a:ea typeface="+mn-ea"/>
+                <a:cs typeface="+mn-cs"/>
+              </a:defRPr>
+            </a:lvl2pPr>
+            <a:lvl3pPr marL="1143000" indent="-228600" algn="r" defTabSz="457200" rtl="1" eaLnBrk="1" latinLnBrk="0" hangingPunct="1">
+              <a:spcBef>
+                <a:spcPts val="1000"/>
+              </a:spcBef>
+              <a:spcAft>
+                <a:spcPts val="0"/>
+              </a:spcAft>
+              <a:buClr>
+                <a:schemeClr val="accent1"/>
+              </a:buClr>
+              <a:buSzPct val="80000"/>
+              <a:buFont typeface="Wingdings 3" charset="2"/>
+              <a:buChar char=""/>
+              <a:defRPr sz="1400" b="0" i="0" kern="1200">
+                <a:solidFill>
+                  <a:schemeClr val="tx1">
+                    <a:lumMod val="75000"/>
+                    <a:lumOff val="25000"/>
+                  </a:schemeClr>
+                </a:solidFill>
+                <a:latin typeface="+mn-lt"/>
+                <a:ea typeface="+mn-ea"/>
+                <a:cs typeface="+mn-cs"/>
+              </a:defRPr>
+            </a:lvl3pPr>
+            <a:lvl4pPr marL="1600200" indent="-228600" algn="r" defTabSz="457200" rtl="1" eaLnBrk="1" latinLnBrk="0" hangingPunct="1">
+              <a:spcBef>
+                <a:spcPts val="1000"/>
+              </a:spcBef>
+              <a:spcAft>
+                <a:spcPts val="0"/>
+              </a:spcAft>
+              <a:buClr>
+                <a:schemeClr val="accent1"/>
+              </a:buClr>
+              <a:buSzPct val="80000"/>
+              <a:buFont typeface="Wingdings 3" charset="2"/>
+              <a:buChar char=""/>
+              <a:defRPr sz="1200" b="0" i="0" kern="1200">
+                <a:solidFill>
+                  <a:schemeClr val="tx1">
+                    <a:lumMod val="75000"/>
+                    <a:lumOff val="25000"/>
+                  </a:schemeClr>
+                </a:solidFill>
+                <a:latin typeface="+mn-lt"/>
+                <a:ea typeface="+mn-ea"/>
+                <a:cs typeface="+mn-cs"/>
+              </a:defRPr>
+            </a:lvl4pPr>
+            <a:lvl5pPr marL="2057400" indent="-228600" algn="r" defTabSz="457200" rtl="1" eaLnBrk="1" latinLnBrk="0" hangingPunct="1">
+              <a:spcBef>
+                <a:spcPts val="1000"/>
+              </a:spcBef>
+              <a:spcAft>
+                <a:spcPts val="0"/>
+              </a:spcAft>
+              <a:buClr>
+                <a:schemeClr val="accent1"/>
+              </a:buClr>
+              <a:buSzPct val="80000"/>
+              <a:buFont typeface="Wingdings 3" charset="2"/>
+              <a:buChar char=""/>
+              <a:defRPr sz="1200" b="0" i="0" kern="1200">
+                <a:solidFill>
+                  <a:schemeClr val="tx1">
+                    <a:lumMod val="75000"/>
+                    <a:lumOff val="25000"/>
+                  </a:schemeClr>
+                </a:solidFill>
+                <a:latin typeface="+mn-lt"/>
+                <a:ea typeface="+mn-ea"/>
+                <a:cs typeface="+mn-cs"/>
+              </a:defRPr>
+            </a:lvl5pPr>
+            <a:lvl6pPr marL="2514600" indent="-228600" algn="r" defTabSz="457200" rtl="1" eaLnBrk="1" latinLnBrk="0" hangingPunct="1">
+              <a:spcBef>
+                <a:spcPts val="1000"/>
+              </a:spcBef>
+              <a:spcAft>
+                <a:spcPts val="0"/>
+              </a:spcAft>
+              <a:buClr>
+                <a:schemeClr val="accent1"/>
+              </a:buClr>
+              <a:buSzPct val="80000"/>
+              <a:buFont typeface="Wingdings 3" charset="2"/>
+              <a:buChar char=""/>
+              <a:defRPr sz="1200" b="0" i="0" kern="1200">
+                <a:solidFill>
+                  <a:schemeClr val="tx1">
+                    <a:lumMod val="75000"/>
+                    <a:lumOff val="25000"/>
+                  </a:schemeClr>
+                </a:solidFill>
+                <a:latin typeface="+mn-lt"/>
+                <a:ea typeface="+mn-ea"/>
+                <a:cs typeface="+mn-cs"/>
+              </a:defRPr>
+            </a:lvl6pPr>
+            <a:lvl7pPr marL="2971800" indent="-228600" algn="r" defTabSz="457200" rtl="1" eaLnBrk="1" latinLnBrk="0" hangingPunct="1">
+              <a:spcBef>
+                <a:spcPts val="1000"/>
+              </a:spcBef>
+              <a:spcAft>
+                <a:spcPts val="0"/>
+              </a:spcAft>
+              <a:buClr>
+                <a:schemeClr val="accent1"/>
+              </a:buClr>
+              <a:buSzPct val="80000"/>
+              <a:buFont typeface="Wingdings 3" charset="2"/>
+              <a:buChar char=""/>
+              <a:defRPr sz="1200" b="0" i="0" kern="1200">
+                <a:solidFill>
+                  <a:schemeClr val="tx1">
+                    <a:lumMod val="75000"/>
+                    <a:lumOff val="25000"/>
+                  </a:schemeClr>
+                </a:solidFill>
+                <a:latin typeface="+mn-lt"/>
+                <a:ea typeface="+mn-ea"/>
+                <a:cs typeface="+mn-cs"/>
+              </a:defRPr>
+            </a:lvl7pPr>
+            <a:lvl8pPr marL="3429000" indent="-228600" algn="r" defTabSz="457200" rtl="1" eaLnBrk="1" latinLnBrk="0" hangingPunct="1">
+              <a:spcBef>
+                <a:spcPts val="1000"/>
+              </a:spcBef>
+              <a:spcAft>
+                <a:spcPts val="0"/>
+              </a:spcAft>
+              <a:buClr>
+                <a:schemeClr val="accent1"/>
+              </a:buClr>
+              <a:buSzPct val="80000"/>
+              <a:buFont typeface="Wingdings 3" charset="2"/>
+              <a:buChar char=""/>
+              <a:defRPr sz="1200" b="0" i="0" kern="1200">
+                <a:solidFill>
+                  <a:schemeClr val="tx1">
+                    <a:lumMod val="75000"/>
+                    <a:lumOff val="25000"/>
+                  </a:schemeClr>
+                </a:solidFill>
+                <a:latin typeface="+mn-lt"/>
+                <a:ea typeface="+mn-ea"/>
+                <a:cs typeface="+mn-cs"/>
+              </a:defRPr>
+            </a:lvl8pPr>
+            <a:lvl9pPr marL="3886200" indent="-228600" algn="r" defTabSz="457200" rtl="1" eaLnBrk="1" latinLnBrk="0" hangingPunct="1">
+              <a:spcBef>
+                <a:spcPts val="1000"/>
+              </a:spcBef>
+              <a:spcAft>
+                <a:spcPts val="0"/>
+              </a:spcAft>
+              <a:buClr>
+                <a:schemeClr val="accent1"/>
+              </a:buClr>
+              <a:buSzPct val="80000"/>
+              <a:buFont typeface="Wingdings 3" charset="2"/>
+              <a:buChar char=""/>
+              <a:defRPr sz="1200" b="0" i="0" kern="1200">
+                <a:solidFill>
+                  <a:schemeClr val="tx1">
+                    <a:lumMod val="75000"/>
+                    <a:lumOff val="25000"/>
+                  </a:schemeClr>
+                </a:solidFill>
+                <a:latin typeface="+mn-lt"/>
+                <a:ea typeface="+mn-ea"/>
+                <a:cs typeface="+mn-cs"/>
+              </a:defRPr>
+            </a:lvl9pPr>
+          </a:lstStyle>
           <a:p>
             <a:pPr algn="l" rtl="0"/>
             <a:r>
@@ -16267,6 +17258,12 @@
               <a:rPr lang="en-US" sz="1800" dirty="0"/>
               <a:t>KNN</a:t>
             </a:r>
+          </a:p>
+          <a:p>
+            <a:pPr marL="0" indent="0" algn="l" rtl="0">
+              <a:buNone/>
+            </a:pPr>
+            <a:endParaRPr lang="en-US" sz="2000" dirty="0"/>
           </a:p>
           <a:p>
             <a:pPr lvl="1" algn="l" rtl="0"/>
@@ -16293,7 +17290,7 @@
 </p:sld>
 </file>
 
-<file path=ppt/slides/slide11.xml><?xml version="1.0" encoding="utf-8"?>
+<file path=ppt/slides/slide13.xml><?xml version="1.0" encoding="utf-8"?>
 <p:sld xmlns:a="http://schemas.openxmlformats.org/drawingml/2006/main" xmlns:r="http://schemas.openxmlformats.org/officeDocument/2006/relationships" xmlns:p="http://schemas.openxmlformats.org/presentationml/2006/main">
   <p:cSld>
     <p:spTree>
@@ -16728,7 +17725,7 @@
 </p:sld>
 </file>
 
-<file path=ppt/slides/slide12.xml><?xml version="1.0" encoding="utf-8"?>
+<file path=ppt/slides/slide14.xml><?xml version="1.0" encoding="utf-8"?>
 <p:sld xmlns:a="http://schemas.openxmlformats.org/drawingml/2006/main" xmlns:r="http://schemas.openxmlformats.org/officeDocument/2006/relationships" xmlns:p="http://schemas.openxmlformats.org/presentationml/2006/main">
   <p:cSld>
     <p:spTree>
@@ -17067,7 +18064,7 @@
 </p:sld>
 </file>
 
-<file path=ppt/slides/slide13.xml><?xml version="1.0" encoding="utf-8"?>
+<file path=ppt/slides/slide15.xml><?xml version="1.0" encoding="utf-8"?>
 <p:sld xmlns:a="http://schemas.openxmlformats.org/drawingml/2006/main" xmlns:r="http://schemas.openxmlformats.org/officeDocument/2006/relationships" xmlns:p="http://schemas.openxmlformats.org/presentationml/2006/main">
   <p:cSld>
     <p:spTree>
@@ -17108,6 +18105,13 @@
             <a:pPr rtl="0"/>
             <a:r>
               <a:rPr lang="en-US" dirty="0"/>
+              <a:t>Some thoughts and </a:t>
+            </a:r>
+            <a:br>
+              <a:rPr lang="en-US" dirty="0"/>
+            </a:br>
+            <a:r>
+              <a:rPr lang="en-US" dirty="0"/>
               <a:t>More Challenges to come…</a:t>
             </a:r>
             <a:endParaRPr lang="he-IL" dirty="0"/>
@@ -17130,8 +18134,8 @@
         </p:nvSpPr>
         <p:spPr>
           <a:xfrm>
-            <a:off x="1154953" y="2603500"/>
-            <a:ext cx="10202858" cy="3416301"/>
+            <a:off x="902290" y="2218488"/>
+            <a:ext cx="10202858" cy="4699669"/>
           </a:xfrm>
           <a:prstGeom prst="rect">
             <a:avLst/>
@@ -17369,6 +18373,42 @@
           <a:p>
             <a:pPr algn="l" rtl="0"/>
             <a:r>
+              <a:rPr lang="en-US" dirty="0"/>
+              <a:t>It is totally different to develop ML vs. Operational SW</a:t>
+            </a:r>
+          </a:p>
+          <a:p>
+            <a:pPr lvl="1" algn="l" rtl="0"/>
+            <a:r>
+              <a:rPr lang="en-US" sz="1800" dirty="0"/>
+              <a:t>Trials take time</a:t>
+            </a:r>
+          </a:p>
+          <a:p>
+            <a:pPr lvl="1" algn="l" rtl="0"/>
+            <a:r>
+              <a:rPr lang="en-US" sz="1800" dirty="0"/>
+              <a:t>Need to track the changes versus previous trial </a:t>
+            </a:r>
+          </a:p>
+          <a:p>
+            <a:pPr lvl="1" algn="l" rtl="0"/>
+            <a:r>
+              <a:rPr lang="en-US" sz="1800" dirty="0"/>
+              <a:t>Need a supporting system</a:t>
+            </a:r>
+            <a:endParaRPr lang="he-IL" sz="1800" dirty="0"/>
+          </a:p>
+          <a:p>
+            <a:pPr algn="l" rtl="0"/>
+            <a:r>
+              <a:rPr lang="en-US" dirty="0"/>
+              <a:t>Still trying to understand why VADER scores perform less than TF-IDF – What else can be done?</a:t>
+            </a:r>
+          </a:p>
+          <a:p>
+            <a:pPr algn="l" rtl="0"/>
+            <a:r>
               <a:rPr lang="en-US" sz="2000" dirty="0"/>
               <a:t>ML  </a:t>
             </a:r>
@@ -17407,23 +18447,6 @@
               <a:rPr lang="en-US" dirty="0"/>
               <a:t>Topic Modelling</a:t>
             </a:r>
-          </a:p>
-          <a:p>
-            <a:pPr lvl="1" algn="l" rtl="0"/>
-            <a:r>
-              <a:rPr lang="en-US" dirty="0"/>
-              <a:t>How to use?</a:t>
-            </a:r>
-          </a:p>
-          <a:p>
-            <a:pPr lvl="1" algn="l" rtl="0"/>
-            <a:r>
-              <a:rPr lang="en-US" dirty="0"/>
-              <a:t>Explore if results make sense</a:t>
-            </a:r>
-          </a:p>
-          <a:p>
-            <a:pPr algn="l" rtl="0"/>
             <a:endParaRPr lang="en-US" sz="2000" dirty="0"/>
           </a:p>
         </p:txBody>
@@ -17441,7 +18464,7 @@
 </p:sld>
 </file>
 
-<file path=ppt/slides/slide14.xml><?xml version="1.0" encoding="utf-8"?>
+<file path=ppt/slides/slide16.xml><?xml version="1.0" encoding="utf-8"?>
 <p:sld xmlns:a="http://schemas.openxmlformats.org/drawingml/2006/main" xmlns:r="http://schemas.openxmlformats.org/officeDocument/2006/relationships" xmlns:p="http://schemas.openxmlformats.org/presentationml/2006/main">
   <p:cSld>
     <p:spTree>
@@ -17541,7 +18564,7 @@
           <a:p>
             <a:r>
               <a:rPr lang="en-US" dirty="0"/>
-              <a:t>Recap</a:t>
+              <a:t>Reminder</a:t>
             </a:r>
             <a:endParaRPr lang="he-IL" dirty="0"/>
           </a:p>
@@ -20249,7 +21272,7 @@
             <a:pPr rtl="0"/>
             <a:r>
               <a:rPr lang="en-US" dirty="0"/>
-              <a:t>Part 3- Embeddings</a:t>
+              <a:t>Part 2- Data preprocessing</a:t>
             </a:r>
             <a:endParaRPr lang="he-IL" dirty="0"/>
           </a:p>
@@ -20550,122 +21573,30 @@
             <a:pPr algn="l" rtl="0"/>
             <a:r>
               <a:rPr lang="en-US" sz="2000" dirty="0"/>
-              <a:t>Bag of Words , </a:t>
-            </a:r>
-            <a:r>
-              <a:rPr lang="en-US" sz="2000" dirty="0" err="1"/>
-              <a:t>Tf-Idf</a:t>
-            </a:r>
-            <a:endParaRPr lang="en-US" sz="1800" dirty="0"/>
-          </a:p>
-          <a:p>
-            <a:pPr marL="0" indent="0" algn="l" rtl="0">
-              <a:buNone/>
-            </a:pPr>
-            <a:endParaRPr lang="he-IL" dirty="0"/>
+              <a:t>By cleaning the data to a significant extent. We may lose the context. </a:t>
+            </a:r>
+            <a:br>
+              <a:rPr lang="en-US" sz="2000" dirty="0"/>
+            </a:br>
+            <a:endParaRPr lang="en-US" sz="2000" dirty="0"/>
+          </a:p>
+          <a:p>
+            <a:pPr algn="l" rtl="0"/>
+            <a:r>
+              <a:rPr lang="en-US" sz="2000" dirty="0"/>
+              <a:t>We used the cleaned data for the machine-learning. For deep-learning, we use cleaned the data to a low extent.</a:t>
+            </a:r>
+            <a:br>
+              <a:rPr lang="en-US" dirty="0"/>
+            </a:br>
+            <a:endParaRPr lang="en-US" dirty="0"/>
           </a:p>
         </p:txBody>
       </p:sp>
-      <p:pic>
-        <p:nvPicPr>
-          <p:cNvPr id="3" name="תמונה 2">
-            <a:extLst>
-              <a:ext uri="{FF2B5EF4-FFF2-40B4-BE49-F238E27FC236}">
-                <a16:creationId xmlns:a16="http://schemas.microsoft.com/office/drawing/2014/main" id="{C45BFB65-E26B-4348-B78D-DECAB0FC02B1}"/>
-              </a:ext>
-            </a:extLst>
-          </p:cNvPr>
-          <p:cNvPicPr>
-            <a:picLocks noChangeAspect="1"/>
-          </p:cNvPicPr>
-          <p:nvPr/>
-        </p:nvPicPr>
-        <p:blipFill>
-          <a:blip r:embed="rId5"/>
-          <a:stretch>
-            <a:fillRect/>
-          </a:stretch>
-        </p:blipFill>
-        <p:spPr>
-          <a:xfrm>
-            <a:off x="3276752" y="3429000"/>
-            <a:ext cx="5638496" cy="1458607"/>
-          </a:xfrm>
-          <a:prstGeom prst="rect">
-            <a:avLst/>
-          </a:prstGeom>
-          <a:ln>
-            <a:noFill/>
-          </a:ln>
-          <a:effectLst>
-            <a:outerShdw blurRad="292100" dist="139700" dir="2700000" algn="tl" rotWithShape="0">
-              <a:srgbClr val="333333">
-                <a:alpha val="65000"/>
-              </a:srgbClr>
-            </a:outerShdw>
-          </a:effectLst>
-        </p:spPr>
-      </p:pic>
-      <p:pic>
-        <p:nvPicPr>
-          <p:cNvPr id="1030" name="Picture 6" descr="TF-IDF Vectorizer scikit-learn. Deep understanding TfidfVectorizer by… | by  Mukesh Chaudhary | Medium">
-            <a:extLst>
-              <a:ext uri="{FF2B5EF4-FFF2-40B4-BE49-F238E27FC236}">
-                <a16:creationId xmlns:a16="http://schemas.microsoft.com/office/drawing/2014/main" id="{537269AD-01BF-44C4-810E-928A925C74A7}"/>
-              </a:ext>
-            </a:extLst>
-          </p:cNvPr>
-          <p:cNvPicPr>
-            <a:picLocks noChangeAspect="1" noChangeArrowheads="1"/>
-          </p:cNvPicPr>
-          <p:nvPr/>
-        </p:nvPicPr>
-        <p:blipFill>
-          <a:blip r:embed="rId6">
-            <a:extLst>
-              <a:ext uri="{28A0092B-C50C-407E-A947-70E740481C1C}">
-                <a14:useLocalDpi xmlns:a14="http://schemas.microsoft.com/office/drawing/2010/main" val="0"/>
-              </a:ext>
-            </a:extLst>
-          </a:blip>
-          <a:srcRect/>
-          <a:stretch>
-            <a:fillRect/>
-          </a:stretch>
-        </p:blipFill>
-        <p:spPr bwMode="auto">
-          <a:xfrm>
-            <a:off x="4011027" y="5127319"/>
-            <a:ext cx="3905250" cy="1171575"/>
-          </a:xfrm>
-          <a:prstGeom prst="rect">
-            <a:avLst/>
-          </a:prstGeom>
-          <a:ln>
-            <a:noFill/>
-          </a:ln>
-          <a:effectLst>
-            <a:outerShdw blurRad="292100" dist="139700" dir="2700000" algn="tl" rotWithShape="0">
-              <a:srgbClr val="333333">
-                <a:alpha val="65000"/>
-              </a:srgbClr>
-            </a:outerShdw>
-          </a:effectLst>
-          <a:extLst>
-            <a:ext uri="{909E8E84-426E-40DD-AFC4-6F175D3DCCD1}">
-              <a14:hiddenFill xmlns:a14="http://schemas.microsoft.com/office/drawing/2010/main">
-                <a:solidFill>
-                  <a:srgbClr val="FFFFFF"/>
-                </a:solidFill>
-              </a14:hiddenFill>
-            </a:ext>
-          </a:extLst>
-        </p:spPr>
-      </p:pic>
     </p:spTree>
     <p:extLst>
       <p:ext uri="{BB962C8B-B14F-4D97-AF65-F5344CB8AC3E}">
-        <p14:creationId xmlns:p14="http://schemas.microsoft.com/office/powerpoint/2010/main" val="3965530469"/>
+        <p14:creationId xmlns:p14="http://schemas.microsoft.com/office/powerpoint/2010/main" val="3993386611"/>
       </p:ext>
     </p:extLst>
   </p:cSld>
@@ -21016,9 +21947,40 @@
           <a:p>
             <a:pPr algn="l" rtl="0"/>
             <a:r>
-              <a:rPr lang="en-US" sz="2000" dirty="0"/>
-              <a:t>Word2Vec  (Doc2Vec)</a:t>
-            </a:r>
+              <a:rPr lang="en-US" dirty="0"/>
+              <a:t>Vectorization: tokens = words and bi-grams</a:t>
+            </a:r>
+          </a:p>
+          <a:p>
+            <a:pPr lvl="1" algn="l" rtl="0"/>
+            <a:r>
+              <a:rPr lang="en-US" dirty="0"/>
+              <a:t>Counting each token per review</a:t>
+            </a:r>
+          </a:p>
+          <a:p>
+            <a:pPr lvl="1" algn="l" rtl="0"/>
+            <a:r>
+              <a:rPr lang="en-US" dirty="0"/>
+              <a:t>VADER score for each token</a:t>
+            </a:r>
+          </a:p>
+          <a:p>
+            <a:pPr lvl="1" algn="l" rtl="0"/>
+            <a:r>
+              <a:rPr lang="en-US" dirty="0"/>
+              <a:t>TF-IDF score for each token</a:t>
+            </a:r>
+          </a:p>
+          <a:p>
+            <a:pPr lvl="1" algn="l" rtl="0"/>
+            <a:r>
+              <a:rPr lang="en-US" dirty="0"/>
+              <a:t>Combination of TF-IDF and VADER (Multiplication)</a:t>
+            </a:r>
+          </a:p>
+          <a:p>
+            <a:pPr algn="l" rtl="0"/>
             <a:endParaRPr lang="en-US" sz="1800" dirty="0"/>
           </a:p>
           <a:p>
@@ -21031,10 +21993,50 @@
       </p:sp>
       <p:pic>
         <p:nvPicPr>
-          <p:cNvPr id="1026" name="Picture 2" descr="Creating Word Embeddings: Coding the Word2Vec Algorithm in Python using  Deep Learning | by Eligijus Bujokas | Towards Data Science">
+          <p:cNvPr id="3" name="תמונה 2">
             <a:extLst>
               <a:ext uri="{FF2B5EF4-FFF2-40B4-BE49-F238E27FC236}">
-                <a16:creationId xmlns:a16="http://schemas.microsoft.com/office/drawing/2014/main" id="{5AC04679-B2E9-4772-B6F3-42D9BF03ECD1}"/>
+                <a16:creationId xmlns:a16="http://schemas.microsoft.com/office/drawing/2014/main" id="{C45BFB65-E26B-4348-B78D-DECAB0FC02B1}"/>
+              </a:ext>
+            </a:extLst>
+          </p:cNvPr>
+          <p:cNvPicPr>
+            <a:picLocks noChangeAspect="1"/>
+          </p:cNvPicPr>
+          <p:nvPr/>
+        </p:nvPicPr>
+        <p:blipFill>
+          <a:blip r:embed="rId5"/>
+          <a:stretch>
+            <a:fillRect/>
+          </a:stretch>
+        </p:blipFill>
+        <p:spPr>
+          <a:xfrm>
+            <a:off x="2043428" y="4985534"/>
+            <a:ext cx="4387211" cy="1134916"/>
+          </a:xfrm>
+          <a:prstGeom prst="rect">
+            <a:avLst/>
+          </a:prstGeom>
+          <a:ln>
+            <a:noFill/>
+          </a:ln>
+          <a:effectLst>
+            <a:outerShdw blurRad="292100" dist="139700" dir="2700000" algn="tl" rotWithShape="0">
+              <a:srgbClr val="333333">
+                <a:alpha val="65000"/>
+              </a:srgbClr>
+            </a:outerShdw>
+          </a:effectLst>
+        </p:spPr>
+      </p:pic>
+      <p:pic>
+        <p:nvPicPr>
+          <p:cNvPr id="1030" name="Picture 6" descr="TF-IDF Vectorizer scikit-learn. Deep understanding TfidfVectorizer by… | by  Mukesh Chaudhary | Medium">
+            <a:extLst>
+              <a:ext uri="{FF2B5EF4-FFF2-40B4-BE49-F238E27FC236}">
+                <a16:creationId xmlns:a16="http://schemas.microsoft.com/office/drawing/2014/main" id="{537269AD-01BF-44C4-810E-928A925C74A7}"/>
               </a:ext>
             </a:extLst>
           </p:cNvPr>
@@ -21044,7 +22046,7 @@
           <p:nvPr/>
         </p:nvPicPr>
         <p:blipFill>
-          <a:blip r:embed="rId5">
+          <a:blip r:embed="rId6">
             <a:extLst>
               <a:ext uri="{28A0092B-C50C-407E-A947-70E740481C1C}">
                 <a14:useLocalDpi xmlns:a14="http://schemas.microsoft.com/office/drawing/2010/main" val="0"/>
@@ -21058,13 +22060,22 @@
         </p:blipFill>
         <p:spPr bwMode="auto">
           <a:xfrm>
-            <a:off x="1911696" y="3429000"/>
-            <a:ext cx="7928811" cy="2776116"/>
+            <a:off x="7810588" y="5052305"/>
+            <a:ext cx="3547224" cy="1064167"/>
           </a:xfrm>
           <a:prstGeom prst="rect">
             <a:avLst/>
           </a:prstGeom>
-          <a:noFill/>
+          <a:ln>
+            <a:noFill/>
+          </a:ln>
+          <a:effectLst>
+            <a:outerShdw blurRad="292100" dist="139700" dir="2700000" algn="tl" rotWithShape="0">
+              <a:srgbClr val="333333">
+                <a:alpha val="65000"/>
+              </a:srgbClr>
+            </a:outerShdw>
+          </a:effectLst>
           <a:extLst>
             <a:ext uri="{909E8E84-426E-40DD-AFC4-6F175D3DCCD1}">
               <a14:hiddenFill xmlns:a14="http://schemas.microsoft.com/office/drawing/2010/main">
@@ -21079,7 +22090,7 @@
     </p:spTree>
     <p:extLst>
       <p:ext uri="{BB962C8B-B14F-4D97-AF65-F5344CB8AC3E}">
-        <p14:creationId xmlns:p14="http://schemas.microsoft.com/office/powerpoint/2010/main" val="3206100885"/>
+        <p14:creationId xmlns:p14="http://schemas.microsoft.com/office/powerpoint/2010/main" val="3965530469"/>
       </p:ext>
     </p:extLst>
   </p:cSld>

</xml_diff>